<commit_message>
assigned the slides to everyone
</commit_message>
<xml_diff>
--- a/documentation/Phase 2 experiments/Presentation second phase.pptx
+++ b/documentation/Phase 2 experiments/Presentation second phase.pptx
@@ -520,31 +520,7 @@
           <a:p>
             <a:r>
               <a:rPr lang="en-GB" dirty="0"/>
-              <a:t>The different objectives for the Second Phase were</a:t>
-            </a:r>
-          </a:p>
-          <a:p>
-            <a:r>
-              <a:rPr lang="en-GB" b="1" u="sng" dirty="0"/>
-              <a:t>	to improve the solar system simulation by using a higher-order differential equations solver</a:t>
-            </a:r>
-          </a:p>
-          <a:p>
-            <a:r>
-              <a:rPr lang="en-GB" b="1" u="sng" dirty="0"/>
-              <a:t>	create a program to simulate the landing on Titan</a:t>
-            </a:r>
-          </a:p>
-          <a:p>
-            <a:r>
-              <a:rPr lang="en-GB" b="1" u="sng" dirty="0"/>
-              <a:t>		Devise an open-loop controller, as well as a feedback controller</a:t>
-            </a:r>
-          </a:p>
-          <a:p>
-            <a:r>
-              <a:rPr lang="en-GB" b="1" u="sng" dirty="0"/>
-              <a:t>	Then, in a next step, add stochastic wind and check which controller is still able to successfully land</a:t>
+              <a:t>Tobias</a:t>
             </a:r>
           </a:p>
         </p:txBody>
@@ -566,7 +542,7 @@
           <a:p>
             <a:fld id="{508C1811-C778-4C97-A863-AD4A19CD14B1}" type="slidenum">
               <a:rPr lang="en-GB" smtClean="0"/>
-              <a:t>2</a:t>
+              <a:t>1</a:t>
             </a:fld>
             <a:endParaRPr lang="en-GB"/>
           </a:p>
@@ -575,7 +551,91 @@
     </p:spTree>
     <p:extLst>
       <p:ext uri="{BB962C8B-B14F-4D97-AF65-F5344CB8AC3E}">
-        <p14:creationId xmlns:p14="http://schemas.microsoft.com/office/powerpoint/2010/main" val="1685193991"/>
+        <p14:creationId xmlns:p14="http://schemas.microsoft.com/office/powerpoint/2010/main" val="981852675"/>
+      </p:ext>
+    </p:extLst>
+  </p:cSld>
+  <p:clrMapOvr>
+    <a:masterClrMapping/>
+  </p:clrMapOvr>
+</p:notes>
+</file>
+
+<file path=ppt/notesSlides/notesSlide10.xml><?xml version="1.0" encoding="utf-8"?>
+<p:notes xmlns:a="http://schemas.openxmlformats.org/drawingml/2006/main" xmlns:r="http://schemas.openxmlformats.org/officeDocument/2006/relationships" xmlns:p="http://schemas.openxmlformats.org/presentationml/2006/main">
+  <p:cSld>
+    <p:spTree>
+      <p:nvGrpSpPr>
+        <p:cNvPr id="1" name=""/>
+        <p:cNvGrpSpPr/>
+        <p:nvPr/>
+      </p:nvGrpSpPr>
+      <p:grpSpPr>
+        <a:xfrm>
+          <a:off x="0" y="0"/>
+          <a:ext cx="0" cy="0"/>
+          <a:chOff x="0" y="0"/>
+          <a:chExt cx="0" cy="0"/>
+        </a:xfrm>
+      </p:grpSpPr>
+      <p:sp>
+        <p:nvSpPr>
+          <p:cNvPr id="2" name="Slide Image Placeholder 1"/>
+          <p:cNvSpPr>
+            <a:spLocks noGrp="1" noRot="1" noChangeAspect="1"/>
+          </p:cNvSpPr>
+          <p:nvPr>
+            <p:ph type="sldImg"/>
+          </p:nvPr>
+        </p:nvSpPr>
+        <p:spPr/>
+      </p:sp>
+      <p:sp>
+        <p:nvSpPr>
+          <p:cNvPr id="3" name="Notes Placeholder 2"/>
+          <p:cNvSpPr>
+            <a:spLocks noGrp="1"/>
+          </p:cNvSpPr>
+          <p:nvPr>
+            <p:ph type="body" idx="1"/>
+          </p:nvPr>
+        </p:nvSpPr>
+        <p:spPr/>
+        <p:txBody>
+          <a:bodyPr/>
+          <a:lstStyle/>
+          <a:p>
+            <a:endParaRPr lang="en-GB" dirty="0"/>
+          </a:p>
+        </p:txBody>
+      </p:sp>
+      <p:sp>
+        <p:nvSpPr>
+          <p:cNvPr id="4" name="Slide Number Placeholder 3"/>
+          <p:cNvSpPr>
+            <a:spLocks noGrp="1"/>
+          </p:cNvSpPr>
+          <p:nvPr>
+            <p:ph type="sldNum" sz="quarter" idx="5"/>
+          </p:nvPr>
+        </p:nvSpPr>
+        <p:spPr/>
+        <p:txBody>
+          <a:bodyPr/>
+          <a:lstStyle/>
+          <a:p>
+            <a:fld id="{508C1811-C778-4C97-A863-AD4A19CD14B1}" type="slidenum">
+              <a:rPr lang="en-GB" smtClean="0"/>
+              <a:t>10</a:t>
+            </a:fld>
+            <a:endParaRPr lang="en-GB"/>
+          </a:p>
+        </p:txBody>
+      </p:sp>
+    </p:spTree>
+    <p:extLst>
+      <p:ext uri="{BB962C8B-B14F-4D97-AF65-F5344CB8AC3E}">
+        <p14:creationId xmlns:p14="http://schemas.microsoft.com/office/powerpoint/2010/main" val="724590109"/>
       </p:ext>
     </p:extLst>
   </p:cSld>
@@ -631,7 +691,7 @@
           <a:p>
             <a:r>
               <a:rPr lang="en-GB" dirty="0"/>
-              <a:t>Valentin or Victor ?</a:t>
+              <a:t>Tobias</a:t>
             </a:r>
           </a:p>
           <a:p>
@@ -639,33 +699,32 @@
           </a:p>
           <a:p>
             <a:r>
+              <a:rPr lang="en-GB" dirty="0"/>
+              <a:t>The different objectives for the Second Phase were</a:t>
+            </a:r>
+          </a:p>
+          <a:p>
+            <a:r>
               <a:rPr lang="en-GB" b="1" u="sng" dirty="0"/>
-              <a:t>In Phase 1, we used Euler’s method to simulate the planets’ motion in the solar system, as well as the motion of the spacecraft. Also, we were not able to reach Titan by shooting the space probe.</a:t>
-            </a:r>
-          </a:p>
-          <a:p>
-            <a:endParaRPr lang="en-GB" b="1" u="sng" dirty="0"/>
+              <a:t>	to improve the solar system simulation by using a higher-order differential equations solver</a:t>
+            </a:r>
           </a:p>
           <a:p>
             <a:r>
               <a:rPr lang="en-GB" b="1" u="sng" dirty="0"/>
-              <a:t>The improvements since the second phase are that we implemented a </a:t>
-            </a:r>
-            <a:r>
-              <a:rPr lang="en-GB" b="1" u="sng" dirty="0" err="1"/>
-              <a:t>Fourt</a:t>
-            </a:r>
+              <a:t>	create a program to simulate the landing on Titan</a:t>
+            </a:r>
+          </a:p>
+          <a:p>
             <a:r>
               <a:rPr lang="en-GB" b="1" u="sng" dirty="0"/>
-              <a:t>-order Runge </a:t>
-            </a:r>
-            <a:r>
-              <a:rPr lang="en-GB" b="1" u="sng" dirty="0" err="1"/>
-              <a:t>Kutta</a:t>
-            </a:r>
+              <a:t>		Devise an open-loop controller, as well as a feedback controller</a:t>
+            </a:r>
+          </a:p>
+          <a:p>
             <a:r>
               <a:rPr lang="en-GB" b="1" u="sng" dirty="0"/>
-              <a:t> method for computing the positions of the different bodies in the Solar System, which is more precise than Euler’s method. Additionally, we now have a method for computing an angle to launch the Space probe in order to reach Titan</a:t>
+              <a:t>	Then, in a next step, add stochastic wind and check which controller is still able to successfully land</a:t>
             </a:r>
           </a:p>
         </p:txBody>
@@ -687,7 +746,7 @@
           <a:p>
             <a:fld id="{508C1811-C778-4C97-A863-AD4A19CD14B1}" type="slidenum">
               <a:rPr lang="en-GB" smtClean="0"/>
-              <a:t>3</a:t>
+              <a:t>2</a:t>
             </a:fld>
             <a:endParaRPr lang="en-GB"/>
           </a:p>
@@ -696,7 +755,7 @@
     </p:spTree>
     <p:extLst>
       <p:ext uri="{BB962C8B-B14F-4D97-AF65-F5344CB8AC3E}">
-        <p14:creationId xmlns:p14="http://schemas.microsoft.com/office/powerpoint/2010/main" val="1167146455"/>
+        <p14:creationId xmlns:p14="http://schemas.microsoft.com/office/powerpoint/2010/main" val="1685193991"/>
       </p:ext>
     </p:extLst>
   </p:cSld>
@@ -751,149 +810,42 @@
           <a:lstStyle/>
           <a:p>
             <a:r>
-              <a:rPr lang="en-US" sz="2400" dirty="0">
-                <a:solidFill>
-                  <a:srgbClr val="000000"/>
-                </a:solidFill>
-              </a:rPr>
-              <a:t>Open-Loop Controller</a:t>
-            </a:r>
-          </a:p>
-          <a:p>
-            <a:pPr lvl="1"/>
-            <a:r>
-              <a:rPr lang="en-US" sz="1800" b="1" u="sng" dirty="0">
-                <a:solidFill>
-                  <a:srgbClr val="000000"/>
-                </a:solidFill>
-              </a:rPr>
-              <a:t>In an open-Loop Controller, </a:t>
-            </a:r>
-            <a:r>
-              <a:rPr lang="en-US" sz="1800" dirty="0">
-                <a:solidFill>
-                  <a:srgbClr val="000000"/>
-                </a:solidFill>
-              </a:rPr>
-              <a:t>the control action performed </a:t>
-            </a:r>
-            <a:r>
-              <a:rPr lang="en-US" sz="1800" b="1" u="sng" dirty="0">
-                <a:solidFill>
-                  <a:srgbClr val="000000"/>
-                </a:solidFill>
-              </a:rPr>
-              <a:t>is </a:t>
-            </a:r>
-            <a:r>
-              <a:rPr lang="en-US" sz="1800" dirty="0">
-                <a:solidFill>
-                  <a:srgbClr val="000000"/>
-                </a:solidFill>
-              </a:rPr>
-              <a:t>independent of the “process output</a:t>
-            </a:r>
-            <a:r>
-              <a:rPr lang="en-US" sz="1800" b="1" u="sng" dirty="0">
-                <a:solidFill>
-                  <a:srgbClr val="000000"/>
-                </a:solidFill>
-              </a:rPr>
-              <a:t>”, which is the variable being controlled</a:t>
-            </a:r>
-          </a:p>
-          <a:p>
-            <a:pPr lvl="1"/>
-            <a:r>
-              <a:rPr lang="en-US" sz="1800" dirty="0">
-                <a:solidFill>
-                  <a:srgbClr val="000000"/>
-                </a:solidFill>
-              </a:rPr>
-              <a:t>Example: heater which heats for a given time</a:t>
-            </a:r>
-            <a:r>
-              <a:rPr lang="en-US" sz="1800" b="1" u="sng" dirty="0">
-                <a:solidFill>
-                  <a:srgbClr val="000000"/>
-                </a:solidFill>
-              </a:rPr>
-              <a:t>, without measuring the temperature of the room</a:t>
-            </a:r>
-          </a:p>
-          <a:p>
-            <a:pPr lvl="1"/>
-            <a:endParaRPr lang="en-US" sz="1800" dirty="0">
-              <a:solidFill>
-                <a:srgbClr val="000000"/>
-              </a:solidFill>
-            </a:endParaRPr>
-          </a:p>
-          <a:p>
-            <a:r>
-              <a:rPr lang="en-US" sz="2200" b="1" u="sng" dirty="0">
-                <a:solidFill>
-                  <a:srgbClr val="000000"/>
-                </a:solidFill>
-              </a:rPr>
-              <a:t>How it works </a:t>
-            </a:r>
-            <a:r>
-              <a:rPr lang="en-US" sz="2200" dirty="0">
-                <a:solidFill>
-                  <a:srgbClr val="000000"/>
-                </a:solidFill>
-              </a:rPr>
-              <a:t>for the landing:</a:t>
-            </a:r>
-          </a:p>
-          <a:p>
-            <a:pPr lvl="1"/>
-            <a:r>
-              <a:rPr lang="en-US" sz="1800" b="1" u="sng" dirty="0">
-                <a:solidFill>
-                  <a:srgbClr val="000000"/>
-                </a:solidFill>
-              </a:rPr>
-              <a:t>The landing module uses a </a:t>
-            </a:r>
-            <a:r>
-              <a:rPr lang="en-US" sz="1800" dirty="0">
-                <a:solidFill>
-                  <a:srgbClr val="000000"/>
-                </a:solidFill>
-              </a:rPr>
-              <a:t>constant thrust </a:t>
-            </a:r>
-            <a:r>
-              <a:rPr lang="en-US" sz="1800" b="1" u="sng" dirty="0">
-                <a:solidFill>
-                  <a:srgbClr val="000000"/>
-                </a:solidFill>
-                <a:effectLst/>
-              </a:rPr>
-              <a:t>at every moment, which would have to be nearly equal in norm to the gravity</a:t>
-            </a:r>
-          </a:p>
-          <a:p>
-            <a:pPr lvl="1"/>
-            <a:endParaRPr lang="en-US" sz="1800" b="1" u="sng" dirty="0">
-              <a:solidFill>
-                <a:srgbClr val="000000"/>
-              </a:solidFill>
-              <a:effectLst/>
-            </a:endParaRPr>
-          </a:p>
-          <a:p>
-            <a:pPr lvl="0"/>
-            <a:r>
-              <a:rPr lang="en-US" sz="1800" b="1" u="sng" dirty="0">
-                <a:solidFill>
-                  <a:srgbClr val="000000"/>
-                </a:solidFill>
-                <a:effectLst/>
-              </a:rPr>
-              <a:t>Does not take into account anything, so can not counter the wind</a:t>
+              <a:rPr lang="en-GB" dirty="0"/>
+              <a:t>Valentin</a:t>
+            </a:r>
+          </a:p>
+          <a:p>
+            <a:endParaRPr lang="en-GB" dirty="0"/>
+          </a:p>
+          <a:p>
+            <a:r>
+              <a:rPr lang="en-GB" b="1" u="sng" dirty="0"/>
+              <a:t>In Phase 1, we used Euler’s method to simulate the planets’ motion in the solar system, as well as the motion of the spacecraft. Also, we were not able to reach Titan by shooting the space probe.</a:t>
+            </a:r>
+          </a:p>
+          <a:p>
+            <a:endParaRPr lang="en-GB" b="1" u="sng" dirty="0"/>
+          </a:p>
+          <a:p>
+            <a:r>
+              <a:rPr lang="en-GB" b="1" u="sng" dirty="0"/>
+              <a:t>The improvements since the second phase are that we implemented a </a:t>
+            </a:r>
+            <a:r>
+              <a:rPr lang="en-GB" b="1" u="sng" dirty="0" err="1"/>
+              <a:t>Fourt</a:t>
+            </a:r>
+            <a:r>
+              <a:rPr lang="en-GB" b="1" u="sng" dirty="0"/>
+              <a:t>-order Runge </a:t>
+            </a:r>
+            <a:r>
+              <a:rPr lang="en-GB" b="1" u="sng" dirty="0" err="1"/>
+              <a:t>Kutta</a:t>
+            </a:r>
+            <a:r>
+              <a:rPr lang="en-GB" b="1" u="sng" dirty="0"/>
+              <a:t> method for computing the positions of the different bodies in the Solar System, which is more precise than Euler’s method. Additionally, we now have a method for computing an angle to launch the Space probe in order to reach Titan</a:t>
             </a:r>
           </a:p>
         </p:txBody>
@@ -915,7 +867,7 @@
           <a:p>
             <a:fld id="{508C1811-C778-4C97-A863-AD4A19CD14B1}" type="slidenum">
               <a:rPr lang="en-GB" smtClean="0"/>
-              <a:t>4</a:t>
+              <a:t>3</a:t>
             </a:fld>
             <a:endParaRPr lang="en-GB"/>
           </a:p>
@@ -924,7 +876,7 @@
     </p:spTree>
     <p:extLst>
       <p:ext uri="{BB962C8B-B14F-4D97-AF65-F5344CB8AC3E}">
-        <p14:creationId xmlns:p14="http://schemas.microsoft.com/office/powerpoint/2010/main" val="1371945585"/>
+        <p14:creationId xmlns:p14="http://schemas.microsoft.com/office/powerpoint/2010/main" val="1167146455"/>
       </p:ext>
     </p:extLst>
   </p:cSld>
@@ -984,35 +936,11 @@
                   <a:srgbClr val="000000"/>
                 </a:solidFill>
               </a:rPr>
-              <a:t>Feedback Controller</a:t>
-            </a:r>
-          </a:p>
-          <a:p>
-            <a:pPr lvl="1"/>
-            <a:r>
-              <a:rPr lang="en-US" sz="2000" dirty="0">
-                <a:solidFill>
-                  <a:srgbClr val="000000"/>
-                </a:solidFill>
-              </a:rPr>
-              <a:t>Opposite of the open-loop controller</a:t>
-            </a:r>
-            <a:r>
-              <a:rPr lang="en-US" sz="2000" b="1" u="sng" dirty="0">
-                <a:solidFill>
-                  <a:srgbClr val="000000"/>
-                </a:solidFill>
-              </a:rPr>
-              <a:t>, so can take into account all given variables, which are the x- and y-position, the x- and y-velocity, as well as the angle</a:t>
-            </a:r>
-            <a:br>
-              <a:rPr lang="en-US" sz="2000" b="1" u="sng" dirty="0">
-                <a:solidFill>
-                  <a:srgbClr val="000000"/>
-                </a:solidFill>
-              </a:rPr>
-            </a:br>
-            <a:endParaRPr lang="en-US" sz="2400" b="1" u="sng" dirty="0">
+              <a:t>Roy</a:t>
+            </a:r>
+          </a:p>
+          <a:p>
+            <a:endParaRPr lang="en-US" sz="2400" dirty="0">
               <a:solidFill>
                 <a:srgbClr val="000000"/>
               </a:solidFill>
@@ -1020,73 +948,151 @@
           </a:p>
           <a:p>
             <a:r>
-              <a:rPr lang="en-US" sz="2400" b="1" u="sng" dirty="0">
+              <a:rPr lang="en-US" sz="2400" dirty="0">
                 <a:solidFill>
                   <a:srgbClr val="000000"/>
                 </a:solidFill>
               </a:rPr>
-              <a:t>In this case, that means:</a:t>
-            </a:r>
-            <a:r>
-              <a:rPr lang="en-US" sz="2400" dirty="0">
+              <a:t>Open-Loop Controller</a:t>
+            </a:r>
+          </a:p>
+          <a:p>
+            <a:pPr lvl="1"/>
+            <a:r>
+              <a:rPr lang="en-US" sz="1800" b="1" u="sng" dirty="0">
                 <a:solidFill>
                   <a:srgbClr val="000000"/>
                 </a:solidFill>
               </a:rPr>
-              <a:t> </a:t>
+              <a:t>In an open-Loop Controller, </a:t>
+            </a:r>
+            <a:r>
+              <a:rPr lang="en-US" sz="1800" dirty="0">
+                <a:solidFill>
+                  <a:srgbClr val="000000"/>
+                </a:solidFill>
+              </a:rPr>
+              <a:t>the control action performed </a:t>
+            </a:r>
+            <a:r>
+              <a:rPr lang="en-US" sz="1800" b="1" u="sng" dirty="0">
+                <a:solidFill>
+                  <a:srgbClr val="000000"/>
+                </a:solidFill>
+              </a:rPr>
+              <a:t>is </a:t>
+            </a:r>
+            <a:r>
+              <a:rPr lang="en-US" sz="1800" dirty="0">
+                <a:solidFill>
+                  <a:srgbClr val="000000"/>
+                </a:solidFill>
+              </a:rPr>
+              <a:t>independent of the “process output</a:t>
+            </a:r>
+            <a:r>
+              <a:rPr lang="en-US" sz="1800" b="1" u="sng" dirty="0">
+                <a:solidFill>
+                  <a:srgbClr val="000000"/>
+                </a:solidFill>
+              </a:rPr>
+              <a:t>”, which is the variable being controlled</a:t>
             </a:r>
           </a:p>
           <a:p>
             <a:pPr lvl="1"/>
             <a:r>
-              <a:rPr lang="en-US" sz="2000" dirty="0">
+              <a:rPr lang="en-US" sz="1800" dirty="0">
                 <a:solidFill>
                   <a:srgbClr val="000000"/>
                 </a:solidFill>
               </a:rPr>
-              <a:t>Correct the x-position </a:t>
-            </a:r>
-            <a:r>
-              <a:rPr lang="en-US" sz="2000" b="1" u="sng" dirty="0">
+              <a:t>Example: heater which heats for a given time</a:t>
+            </a:r>
+            <a:r>
+              <a:rPr lang="en-US" sz="1800" b="1" u="sng" dirty="0">
                 <a:solidFill>
                   <a:srgbClr val="000000"/>
                 </a:solidFill>
               </a:rPr>
-              <a:t>by modifying the angle of the landing module</a:t>
-            </a:r>
-            <a:r>
-              <a:rPr lang="en-GB" sz="2000" b="1" u="sng" dirty="0">
-                <a:solidFill>
-                  <a:srgbClr val="000000"/>
-                </a:solidFill>
-              </a:rPr>
-              <a:t> in order to make the main thruster exert a partially horizontal force</a:t>
+              <a:t>, without measuring the temperature of the room</a:t>
             </a:r>
           </a:p>
           <a:p>
             <a:pPr lvl="1"/>
-            <a:r>
-              <a:rPr lang="en-GB" sz="2000" b="0" i="0" u="none" dirty="0">
-                <a:solidFill>
-                  <a:srgbClr val="000000"/>
-                </a:solidFill>
-              </a:rPr>
-              <a:t>Determine whether we need to use the thruster </a:t>
-            </a:r>
-            <a:r>
-              <a:rPr lang="en-GB" sz="2000" b="1" i="0" u="sng" dirty="0">
-                <a:solidFill>
-                  <a:srgbClr val="000000"/>
-                </a:solidFill>
-              </a:rPr>
-              <a:t>or not in order to land safely</a:t>
-            </a:r>
-            <a:endParaRPr lang="en-US" sz="2000" b="1" i="0" u="sng" dirty="0">
+            <a:endParaRPr lang="en-US" sz="1800" dirty="0">
               <a:solidFill>
                 <a:srgbClr val="000000"/>
               </a:solidFill>
             </a:endParaRPr>
           </a:p>
+          <a:p>
+            <a:r>
+              <a:rPr lang="en-US" sz="2200" b="1" u="sng" dirty="0">
+                <a:solidFill>
+                  <a:srgbClr val="000000"/>
+                </a:solidFill>
+              </a:rPr>
+              <a:t>How it works </a:t>
+            </a:r>
+            <a:r>
+              <a:rPr lang="en-US" sz="2200" dirty="0">
+                <a:solidFill>
+                  <a:srgbClr val="000000"/>
+                </a:solidFill>
+              </a:rPr>
+              <a:t>for the landing:</a:t>
+            </a:r>
+          </a:p>
+          <a:p>
+            <a:pPr lvl="1"/>
+            <a:r>
+              <a:rPr lang="en-US" sz="1800" b="1" u="sng" dirty="0">
+                <a:solidFill>
+                  <a:srgbClr val="000000"/>
+                </a:solidFill>
+              </a:rPr>
+              <a:t>The landing module uses a </a:t>
+            </a:r>
+            <a:r>
+              <a:rPr lang="en-US" sz="1800" dirty="0">
+                <a:solidFill>
+                  <a:srgbClr val="000000"/>
+                </a:solidFill>
+              </a:rPr>
+              <a:t>constant thrust </a:t>
+            </a:r>
+            <a:r>
+              <a:rPr lang="en-US" sz="1800" b="1" u="sng" dirty="0">
+                <a:solidFill>
+                  <a:srgbClr val="000000"/>
+                </a:solidFill>
+                <a:effectLst/>
+              </a:rPr>
+              <a:t>at every moment, which would have to be nearly equal in norm to the gravity</a:t>
+            </a:r>
+          </a:p>
+          <a:p>
+            <a:pPr lvl="1"/>
+            <a:endParaRPr lang="en-US" sz="1800" b="1" u="sng" dirty="0">
+              <a:solidFill>
+                <a:srgbClr val="000000"/>
+              </a:solidFill>
+              <a:effectLst/>
+            </a:endParaRPr>
+          </a:p>
+          <a:p>
+            <a:pPr lvl="0"/>
+            <a:r>
+              <a:rPr lang="en-US" sz="1800" b="1" u="sng" dirty="0">
+                <a:solidFill>
+                  <a:srgbClr val="000000"/>
+                </a:solidFill>
+                <a:effectLst/>
+              </a:rPr>
+              <a:t>Does not take into account anything, so can not counter the wind</a:t>
+            </a:r>
+          </a:p>
         </p:txBody>
       </p:sp>
       <p:sp>
@@ -1106,7 +1112,7 @@
           <a:p>
             <a:fld id="{508C1811-C778-4C97-A863-AD4A19CD14B1}" type="slidenum">
               <a:rPr lang="en-GB" smtClean="0"/>
-              <a:t>5</a:t>
+              <a:t>4</a:t>
             </a:fld>
             <a:endParaRPr lang="en-GB"/>
           </a:p>
@@ -1115,7 +1121,7 @@
     </p:spTree>
     <p:extLst>
       <p:ext uri="{BB962C8B-B14F-4D97-AF65-F5344CB8AC3E}">
-        <p14:creationId xmlns:p14="http://schemas.microsoft.com/office/powerpoint/2010/main" val="2605890027"/>
+        <p14:creationId xmlns:p14="http://schemas.microsoft.com/office/powerpoint/2010/main" val="1371945585"/>
       </p:ext>
     </p:extLst>
   </p:cSld>
@@ -1170,94 +1176,136 @@
           <a:lstStyle/>
           <a:p>
             <a:r>
-              <a:rPr lang="en-US" sz="2000" b="1" i="0" u="sng" dirty="0">
+              <a:rPr lang="en-US" sz="2400" dirty="0" err="1">
                 <a:solidFill>
                   <a:srgbClr val="000000"/>
                 </a:solidFill>
               </a:rPr>
-              <a:t>In our model, we have a constant setting the maximum acceleration caused by the wind</a:t>
-            </a:r>
-          </a:p>
-          <a:p>
+              <a:t>Joep</a:t>
+            </a:r>
+            <a:endParaRPr lang="en-US" sz="2400" dirty="0">
+              <a:solidFill>
+                <a:srgbClr val="000000"/>
+              </a:solidFill>
+            </a:endParaRPr>
+          </a:p>
+          <a:p>
+            <a:endParaRPr lang="en-US" sz="2400" dirty="0">
+              <a:solidFill>
+                <a:srgbClr val="000000"/>
+              </a:solidFill>
+            </a:endParaRPr>
+          </a:p>
+          <a:p>
+            <a:r>
+              <a:rPr lang="en-US" sz="2400" dirty="0">
+                <a:solidFill>
+                  <a:srgbClr val="000000"/>
+                </a:solidFill>
+              </a:rPr>
+              <a:t>Feedback Controller</a:t>
+            </a:r>
+          </a:p>
+          <a:p>
+            <a:pPr lvl="1"/>
+            <a:r>
+              <a:rPr lang="en-US" sz="2000" dirty="0">
+                <a:solidFill>
+                  <a:srgbClr val="000000"/>
+                </a:solidFill>
+              </a:rPr>
+              <a:t>Opposite of the open-loop controller</a:t>
+            </a:r>
+            <a:r>
+              <a:rPr lang="en-US" sz="2000" b="1" u="sng" dirty="0">
+                <a:solidFill>
+                  <a:srgbClr val="000000"/>
+                </a:solidFill>
+              </a:rPr>
+              <a:t>, so can take into account all given variables, which are the x- and y-position, the x- and y-velocity, as well as the angle</a:t>
+            </a:r>
+            <a:br>
+              <a:rPr lang="en-US" sz="2000" b="1" u="sng" dirty="0">
+                <a:solidFill>
+                  <a:srgbClr val="000000"/>
+                </a:solidFill>
+              </a:rPr>
+            </a:br>
+            <a:endParaRPr lang="en-US" sz="2400" b="1" u="sng" dirty="0">
+              <a:solidFill>
+                <a:srgbClr val="000000"/>
+              </a:solidFill>
+            </a:endParaRPr>
+          </a:p>
+          <a:p>
+            <a:r>
+              <a:rPr lang="en-US" sz="2400" b="1" u="sng" dirty="0">
+                <a:solidFill>
+                  <a:srgbClr val="000000"/>
+                </a:solidFill>
+              </a:rPr>
+              <a:t>In this case, that means:</a:t>
+            </a:r>
+            <a:r>
+              <a:rPr lang="en-US" sz="2400" dirty="0">
+                <a:solidFill>
+                  <a:srgbClr val="000000"/>
+                </a:solidFill>
+              </a:rPr>
+              <a:t> </a:t>
+            </a:r>
+          </a:p>
+          <a:p>
+            <a:pPr lvl="1"/>
+            <a:r>
+              <a:rPr lang="en-US" sz="2000" dirty="0">
+                <a:solidFill>
+                  <a:srgbClr val="000000"/>
+                </a:solidFill>
+              </a:rPr>
+              <a:t>Correct the x-position </a:t>
+            </a:r>
+            <a:r>
+              <a:rPr lang="en-US" sz="2000" b="1" u="sng" dirty="0">
+                <a:solidFill>
+                  <a:srgbClr val="000000"/>
+                </a:solidFill>
+              </a:rPr>
+              <a:t>by modifying the angle of the landing module</a:t>
+            </a:r>
+            <a:r>
+              <a:rPr lang="en-GB" sz="2000" b="1" u="sng" dirty="0">
+                <a:solidFill>
+                  <a:srgbClr val="000000"/>
+                </a:solidFill>
+              </a:rPr>
+              <a:t> in order to make the main thruster exert a partially horizontal force</a:t>
+            </a:r>
+          </a:p>
+          <a:p>
+            <a:pPr lvl="1"/>
+            <a:r>
+              <a:rPr lang="en-GB" sz="2000" b="0" i="0" u="none" dirty="0">
+                <a:solidFill>
+                  <a:srgbClr val="000000"/>
+                </a:solidFill>
+              </a:rPr>
+              <a:t>Determine whether we need to use the thruster </a:t>
+            </a:r>
+            <a:r>
+              <a:rPr lang="en-GB" sz="2000" b="1" i="0" u="sng" dirty="0">
+                <a:solidFill>
+                  <a:srgbClr val="000000"/>
+                </a:solidFill>
+              </a:rPr>
+              <a:t>or not in order to land safely</a:t>
+            </a:r>
             <a:endParaRPr lang="en-US" sz="2000" b="1" i="0" u="sng" dirty="0">
               <a:solidFill>
                 <a:srgbClr val="000000"/>
               </a:solidFill>
             </a:endParaRPr>
           </a:p>
-          <a:p>
-            <a:r>
-              <a:rPr lang="en-US" sz="2000" b="1" i="0" u="sng" dirty="0">
-                <a:solidFill>
-                  <a:srgbClr val="000000"/>
-                </a:solidFill>
-              </a:rPr>
-              <a:t>The generated wind is generated in a random direction and of a randomized intensity between 0 and 1.</a:t>
-            </a:r>
-          </a:p>
-          <a:p>
-            <a:endParaRPr lang="en-US" sz="2000" b="1" i="0" u="sng" dirty="0">
-              <a:solidFill>
-                <a:srgbClr val="000000"/>
-              </a:solidFill>
-            </a:endParaRPr>
-          </a:p>
-          <a:p>
-            <a:r>
-              <a:rPr lang="en-US" sz="2000" b="1" i="0" u="sng" dirty="0">
-                <a:solidFill>
-                  <a:srgbClr val="000000"/>
-                </a:solidFill>
-              </a:rPr>
-              <a:t>We read that the strongest wind measured during the landing of the probe from NASA was 120 m/s, but given that our thruster is set to have a maximum strength of 2500 N, we couldn’t make the maximum wind 120 m/s </a:t>
-            </a:r>
-            <a:r>
-              <a:rPr lang="en-US" sz="2000" b="1" i="1" u="none" dirty="0">
-                <a:solidFill>
-                  <a:srgbClr val="000000"/>
-                </a:solidFill>
-              </a:rPr>
-              <a:t>*</a:t>
-            </a:r>
-            <a:r>
-              <a:rPr lang="en-US" sz="2000" b="0" i="1" u="none" dirty="0">
-                <a:solidFill>
-                  <a:srgbClr val="000000"/>
-                </a:solidFill>
-              </a:rPr>
-              <a:t>(</a:t>
-            </a:r>
-            <a:r>
-              <a:rPr lang="en-US" sz="2000" b="1" i="1" u="none" dirty="0">
-                <a:solidFill>
-                  <a:srgbClr val="000000"/>
-                </a:solidFill>
-              </a:rPr>
-              <a:t>SAY THIS ONLY IF THEY ASK !!! </a:t>
-            </a:r>
-            <a:r>
-              <a:rPr lang="en-US" sz="2000" b="0" i="1" u="none" dirty="0">
-                <a:solidFill>
-                  <a:srgbClr val="000000"/>
-                </a:solidFill>
-              </a:rPr>
-              <a:t>thruster force in Newtons still needs to be divided by the weight of the landing module, which we set to 800 kgs)*</a:t>
-            </a:r>
-          </a:p>
-          <a:p>
-            <a:endParaRPr lang="en-US" sz="2000" b="0" i="1" u="none" dirty="0">
-              <a:solidFill>
-                <a:srgbClr val="000000"/>
-              </a:solidFill>
-            </a:endParaRPr>
-          </a:p>
-          <a:p>
-            <a:endParaRPr lang="en-US" sz="2000" b="0" i="1" u="none" dirty="0">
-              <a:solidFill>
-                <a:srgbClr val="000000"/>
-              </a:solidFill>
-            </a:endParaRPr>
-          </a:p>
         </p:txBody>
       </p:sp>
       <p:sp>
@@ -1277,7 +1325,7 @@
           <a:p>
             <a:fld id="{508C1811-C778-4C97-A863-AD4A19CD14B1}" type="slidenum">
               <a:rPr lang="en-GB" smtClean="0"/>
-              <a:t>6</a:t>
+              <a:t>5</a:t>
             </a:fld>
             <a:endParaRPr lang="en-GB"/>
           </a:p>
@@ -1286,7 +1334,7 @@
     </p:spTree>
     <p:extLst>
       <p:ext uri="{BB962C8B-B14F-4D97-AF65-F5344CB8AC3E}">
-        <p14:creationId xmlns:p14="http://schemas.microsoft.com/office/powerpoint/2010/main" val="3745284967"/>
+        <p14:creationId xmlns:p14="http://schemas.microsoft.com/office/powerpoint/2010/main" val="2605890027"/>
       </p:ext>
     </p:extLst>
   </p:cSld>
@@ -1341,35 +1389,110 @@
           <a:lstStyle/>
           <a:p>
             <a:r>
-              <a:rPr lang="nl-NL" dirty="0"/>
-              <a:t>Made experiments by modifying parameters </a:t>
-            </a:r>
-            <a:r>
-              <a:rPr lang="nl-NL" b="1" u="sng" dirty="0"/>
-              <a:t>one at a time</a:t>
-            </a:r>
-            <a:r>
-              <a:rPr lang="nl-NL" dirty="0"/>
-              <a:t>, then measured the </a:t>
-            </a:r>
-            <a:r>
-              <a:rPr lang="nl-NL" b="1" u="sng" dirty="0"/>
-              <a:t>x- and y- positions and velocities, as well as the angle and the time the landing module took to land</a:t>
-            </a:r>
-            <a:br>
-              <a:rPr lang="nl-NL" dirty="0"/>
-            </a:br>
-            <a:endParaRPr lang="nl-NL" dirty="0"/>
-          </a:p>
-          <a:p>
-            <a:r>
-              <a:rPr lang="nl-NL" dirty="0"/>
-              <a:t>See Excel sheet </a:t>
-            </a:r>
-            <a:r>
-              <a:rPr lang="nl-NL" i="1" dirty="0"/>
-              <a:t>*show the Excel sheet to them*</a:t>
-            </a:r>
+              <a:rPr lang="en-US" sz="2000" b="0" i="0" u="none" dirty="0">
+                <a:solidFill>
+                  <a:srgbClr val="000000"/>
+                </a:solidFill>
+              </a:rPr>
+              <a:t>Victor</a:t>
+            </a:r>
+          </a:p>
+          <a:p>
+            <a:endParaRPr lang="en-US" sz="2000" b="1" i="0" u="sng" dirty="0">
+              <a:solidFill>
+                <a:srgbClr val="000000"/>
+              </a:solidFill>
+            </a:endParaRPr>
+          </a:p>
+          <a:p>
+            <a:r>
+              <a:rPr lang="en-US" sz="2000" b="1" i="0" u="sng" dirty="0">
+                <a:solidFill>
+                  <a:srgbClr val="000000"/>
+                </a:solidFill>
+              </a:rPr>
+              <a:t>In our model, we have a constant setting the maximum acceleration caused by the wind</a:t>
+            </a:r>
+          </a:p>
+          <a:p>
+            <a:endParaRPr lang="en-US" sz="2000" b="1" i="0" u="sng" dirty="0">
+              <a:solidFill>
+                <a:srgbClr val="000000"/>
+              </a:solidFill>
+            </a:endParaRPr>
+          </a:p>
+          <a:p>
+            <a:r>
+              <a:rPr lang="en-US" sz="2000" b="1" i="0" u="sng" dirty="0">
+                <a:solidFill>
+                  <a:srgbClr val="000000"/>
+                </a:solidFill>
+              </a:rPr>
+              <a:t>The generated wind is generated in a random direction and of a randomized intensity between 0 and 1.</a:t>
+            </a:r>
+          </a:p>
+          <a:p>
+            <a:endParaRPr lang="en-US" sz="2000" b="1" i="0" u="sng" dirty="0">
+              <a:solidFill>
+                <a:srgbClr val="000000"/>
+              </a:solidFill>
+            </a:endParaRPr>
+          </a:p>
+          <a:p>
+            <a:r>
+              <a:rPr lang="en-US" sz="2000" b="1" i="0" u="sng" dirty="0">
+                <a:solidFill>
+                  <a:srgbClr val="000000"/>
+                </a:solidFill>
+              </a:rPr>
+              <a:t>We read that the strongest wind measured during the landing of the probe from NASA was 120 m/s, but given that our thruster is set to have a maximum strength of 2500 N, we couldn’t make the maximum wind 120 m/s </a:t>
+            </a:r>
+            <a:r>
+              <a:rPr lang="en-US" sz="2000" b="1" i="1" u="none" dirty="0">
+                <a:solidFill>
+                  <a:srgbClr val="000000"/>
+                </a:solidFill>
+              </a:rPr>
+              <a:t>*</a:t>
+            </a:r>
+            <a:r>
+              <a:rPr lang="en-US" sz="2000" b="0" i="1" u="none" dirty="0">
+                <a:solidFill>
+                  <a:srgbClr val="000000"/>
+                </a:solidFill>
+              </a:rPr>
+              <a:t>(</a:t>
+            </a:r>
+            <a:r>
+              <a:rPr lang="en-US" sz="2000" b="1" i="1" u="none" dirty="0">
+                <a:solidFill>
+                  <a:srgbClr val="000000"/>
+                </a:solidFill>
+              </a:rPr>
+              <a:t>SAY THIS ONLY IF THEY ASK !!! </a:t>
+            </a:r>
+            <a:r>
+              <a:rPr lang="en-US" sz="2000" b="0" i="1" u="none" dirty="0">
+                <a:solidFill>
+                  <a:srgbClr val="000000"/>
+                </a:solidFill>
+              </a:rPr>
+              <a:t>thruster force in Newtons still needs to be divided by the weight of the landing module, which we set to 800 kgs)*</a:t>
+            </a:r>
+          </a:p>
+          <a:p>
+            <a:endParaRPr lang="en-US" sz="2000" b="0" i="1" u="none" dirty="0">
+              <a:solidFill>
+                <a:srgbClr val="000000"/>
+              </a:solidFill>
+            </a:endParaRPr>
+          </a:p>
+          <a:p>
+            <a:endParaRPr lang="en-US" sz="2000" b="0" i="1" u="none" dirty="0">
+              <a:solidFill>
+                <a:srgbClr val="000000"/>
+              </a:solidFill>
+            </a:endParaRPr>
           </a:p>
         </p:txBody>
       </p:sp>
@@ -1390,7 +1513,7 @@
           <a:p>
             <a:fld id="{508C1811-C778-4C97-A863-AD4A19CD14B1}" type="slidenum">
               <a:rPr lang="en-GB" smtClean="0"/>
-              <a:t>7</a:t>
+              <a:t>6</a:t>
             </a:fld>
             <a:endParaRPr lang="en-GB"/>
           </a:p>
@@ -1399,7 +1522,7 @@
     </p:spTree>
     <p:extLst>
       <p:ext uri="{BB962C8B-B14F-4D97-AF65-F5344CB8AC3E}">
-        <p14:creationId xmlns:p14="http://schemas.microsoft.com/office/powerpoint/2010/main" val="2291648635"/>
+        <p14:creationId xmlns:p14="http://schemas.microsoft.com/office/powerpoint/2010/main" val="3745284967"/>
       </p:ext>
     </p:extLst>
   </p:cSld>
@@ -1454,69 +1577,43 @@
           <a:lstStyle/>
           <a:p>
             <a:r>
-              <a:rPr lang="en-GB" b="1" u="sng" dirty="0"/>
-              <a:t>Main tasks:</a:t>
-            </a:r>
-          </a:p>
-          <a:p>
-            <a:r>
-              <a:rPr lang="en-GB" b="1" u="sng" dirty="0"/>
-              <a:t>	Realizing a return mission from the orbit of the Titan </a:t>
-            </a:r>
-            <a:r>
-              <a:rPr lang="en-GB" i="1" dirty="0"/>
-              <a:t>*(ask if it is from the orbit or from the ground of Titan)*</a:t>
-            </a:r>
-          </a:p>
-          <a:p>
-            <a:r>
-              <a:rPr lang="en-GB" dirty="0"/>
-              <a:t>	</a:t>
-            </a:r>
-            <a:r>
-              <a:rPr lang="en-GB" b="1" i="0" u="sng" dirty="0"/>
-              <a:t>Reduce mission costs by reducing fuel consumption of the travel</a:t>
-            </a:r>
-          </a:p>
-          <a:p>
-            <a:r>
-              <a:rPr lang="en-GB" b="1" i="0" u="sng" dirty="0"/>
-              <a:t>		Idea: gravitation assist, problem: how to do that, we need to find formulas for it</a:t>
-            </a:r>
-          </a:p>
-          <a:p>
-            <a:r>
-              <a:rPr lang="en-GB" b="1" i="0" u="sng" dirty="0"/>
-              <a:t>	Search ways to improve the time taken for the travel </a:t>
-            </a:r>
-            <a:r>
-              <a:rPr lang="en-GB" i="1" dirty="0"/>
-              <a:t>*(ask if it concerns only the time of travel or also the time of landing)*</a:t>
-            </a:r>
-          </a:p>
-          <a:p>
-            <a:r>
-              <a:rPr lang="en-GB" i="0" dirty="0"/>
-              <a:t>	</a:t>
-            </a:r>
-            <a:r>
-              <a:rPr lang="en-GB" b="1" i="0" u="sng" dirty="0"/>
-              <a:t>Write report</a:t>
-            </a:r>
-          </a:p>
-          <a:p>
-            <a:endParaRPr lang="en-GB" b="1" i="0" u="sng" dirty="0"/>
-          </a:p>
-          <a:p>
-            <a:r>
-              <a:rPr lang="en-GB" b="1" i="0" u="sng" dirty="0"/>
-              <a:t>Other tasks:</a:t>
-            </a:r>
-          </a:p>
-          <a:p>
-            <a:r>
-              <a:rPr lang="en-GB" b="1" i="0" u="sng" dirty="0"/>
-              <a:t>	do experiments with the mission and find which parameters we could do experiments with</a:t>
+              <a:rPr lang="nl-NL" dirty="0"/>
+              <a:t>Valentin</a:t>
+            </a:r>
+          </a:p>
+          <a:p>
+            <a:endParaRPr lang="nl-NL" dirty="0"/>
+          </a:p>
+          <a:p>
+            <a:r>
+              <a:rPr lang="nl-NL" dirty="0"/>
+              <a:t>Made experiments by modifying parameters </a:t>
+            </a:r>
+            <a:r>
+              <a:rPr lang="nl-NL" b="1" u="sng" dirty="0"/>
+              <a:t>one at a time</a:t>
+            </a:r>
+            <a:r>
+              <a:rPr lang="nl-NL" dirty="0"/>
+              <a:t>, then measured the </a:t>
+            </a:r>
+            <a:r>
+              <a:rPr lang="nl-NL" b="1" u="sng" dirty="0"/>
+              <a:t>x- and y- positions and velocities, as well as the angle and the time the landing module took to land</a:t>
+            </a:r>
+            <a:br>
+              <a:rPr lang="nl-NL" dirty="0"/>
+            </a:br>
+            <a:endParaRPr lang="nl-NL" dirty="0"/>
+          </a:p>
+          <a:p>
+            <a:r>
+              <a:rPr lang="nl-NL" dirty="0"/>
+              <a:t>See Excel sheet </a:t>
+            </a:r>
+            <a:r>
+              <a:rPr lang="nl-NL" i="1" dirty="0"/>
+              <a:t>*show the Excel sheet to them*</a:t>
             </a:r>
           </a:p>
         </p:txBody>
@@ -1538,7 +1635,7 @@
           <a:p>
             <a:fld id="{508C1811-C778-4C97-A863-AD4A19CD14B1}" type="slidenum">
               <a:rPr lang="en-GB" smtClean="0"/>
-              <a:t>8</a:t>
+              <a:t>7</a:t>
             </a:fld>
             <a:endParaRPr lang="en-GB"/>
           </a:p>
@@ -1547,7 +1644,7 @@
     </p:spTree>
     <p:extLst>
       <p:ext uri="{BB962C8B-B14F-4D97-AF65-F5344CB8AC3E}">
-        <p14:creationId xmlns:p14="http://schemas.microsoft.com/office/powerpoint/2010/main" val="344017163"/>
+        <p14:creationId xmlns:p14="http://schemas.microsoft.com/office/powerpoint/2010/main" val="2291648635"/>
       </p:ext>
     </p:extLst>
   </p:cSld>
@@ -1602,8 +1699,78 @@
           <a:lstStyle/>
           <a:p>
             <a:r>
+              <a:rPr lang="en-GB" b="0" u="none" dirty="0"/>
+              <a:t>Paula</a:t>
+            </a:r>
+          </a:p>
+          <a:p>
+            <a:endParaRPr lang="en-GB" b="1" u="sng" dirty="0"/>
+          </a:p>
+          <a:p>
+            <a:r>
               <a:rPr lang="en-GB" b="1" u="sng" dirty="0"/>
-              <a:t>*Show demo by running program on someone’s computer*</a:t>
+              <a:t>Main tasks:</a:t>
+            </a:r>
+          </a:p>
+          <a:p>
+            <a:r>
+              <a:rPr lang="en-GB" b="1" u="sng" dirty="0"/>
+              <a:t>	Realizing a return mission from the orbit of the Titan </a:t>
+            </a:r>
+            <a:r>
+              <a:rPr lang="en-GB" i="1" dirty="0"/>
+              <a:t>*(ask if it is from the orbit or from the ground of Titan)*</a:t>
+            </a:r>
+          </a:p>
+          <a:p>
+            <a:r>
+              <a:rPr lang="en-GB" dirty="0"/>
+              <a:t>	</a:t>
+            </a:r>
+            <a:r>
+              <a:rPr lang="en-GB" b="1" i="0" u="sng" dirty="0"/>
+              <a:t>Reduce mission costs by reducing fuel consumption of the travel</a:t>
+            </a:r>
+          </a:p>
+          <a:p>
+            <a:r>
+              <a:rPr lang="en-GB" b="1" i="0" u="sng" dirty="0"/>
+              <a:t>		Idea: gravitation assist, problem: how to do that, we need to find formulas for it</a:t>
+            </a:r>
+          </a:p>
+          <a:p>
+            <a:r>
+              <a:rPr lang="en-GB" b="1" i="0" u="sng" dirty="0"/>
+              <a:t>	Search ways to improve the time taken for the travel </a:t>
+            </a:r>
+            <a:r>
+              <a:rPr lang="en-GB" i="1" dirty="0"/>
+              <a:t>*(ask if it concerns only the time of travel or also the time of landing)*</a:t>
+            </a:r>
+          </a:p>
+          <a:p>
+            <a:r>
+              <a:rPr lang="en-GB" i="0" dirty="0"/>
+              <a:t>	</a:t>
+            </a:r>
+            <a:r>
+              <a:rPr lang="en-GB" b="1" i="0" u="sng" dirty="0"/>
+              <a:t>Write report</a:t>
+            </a:r>
+          </a:p>
+          <a:p>
+            <a:endParaRPr lang="en-GB" b="1" i="0" u="sng" dirty="0"/>
+          </a:p>
+          <a:p>
+            <a:r>
+              <a:rPr lang="en-GB" b="1" i="0" u="sng" dirty="0"/>
+              <a:t>Other tasks:</a:t>
+            </a:r>
+          </a:p>
+          <a:p>
+            <a:r>
+              <a:rPr lang="en-GB" b="1" i="0" u="sng" dirty="0"/>
+              <a:t>	do experiments with the mission and find which parameters we could do experiments with</a:t>
             </a:r>
           </a:p>
         </p:txBody>
@@ -1625,7 +1792,7 @@
           <a:p>
             <a:fld id="{508C1811-C778-4C97-A863-AD4A19CD14B1}" type="slidenum">
               <a:rPr lang="en-GB" smtClean="0"/>
-              <a:t>9</a:t>
+              <a:t>8</a:t>
             </a:fld>
             <a:endParaRPr lang="en-GB"/>
           </a:p>
@@ -1634,7 +1801,7 @@
     </p:spTree>
     <p:extLst>
       <p:ext uri="{BB962C8B-B14F-4D97-AF65-F5344CB8AC3E}">
-        <p14:creationId xmlns:p14="http://schemas.microsoft.com/office/powerpoint/2010/main" val="1008206631"/>
+        <p14:creationId xmlns:p14="http://schemas.microsoft.com/office/powerpoint/2010/main" val="344017163"/>
       </p:ext>
     </p:extLst>
   </p:cSld>
@@ -1688,7 +1855,10 @@
           <a:bodyPr/>
           <a:lstStyle/>
           <a:p>
-            <a:endParaRPr lang="en-GB" dirty="0"/>
+            <a:r>
+              <a:rPr lang="en-GB" b="1" u="sng" dirty="0"/>
+              <a:t>*Show demo by running program on someone’s computer*</a:t>
+            </a:r>
           </a:p>
         </p:txBody>
       </p:sp>
@@ -1709,7 +1879,7 @@
           <a:p>
             <a:fld id="{508C1811-C778-4C97-A863-AD4A19CD14B1}" type="slidenum">
               <a:rPr lang="en-GB" smtClean="0"/>
-              <a:t>10</a:t>
+              <a:t>9</a:t>
             </a:fld>
             <a:endParaRPr lang="en-GB"/>
           </a:p>
@@ -1718,7 +1888,7 @@
     </p:spTree>
     <p:extLst>
       <p:ext uri="{BB962C8B-B14F-4D97-AF65-F5344CB8AC3E}">
-        <p14:creationId xmlns:p14="http://schemas.microsoft.com/office/powerpoint/2010/main" val="724590109"/>
+        <p14:creationId xmlns:p14="http://schemas.microsoft.com/office/powerpoint/2010/main" val="1008206631"/>
       </p:ext>
     </p:extLst>
   </p:cSld>
@@ -5060,7 +5230,7 @@
           </p:nvPr>
         </p:nvPicPr>
         <p:blipFill>
-          <a:blip r:embed="rId2">
+          <a:blip r:embed="rId3">
             <a:extLst>
               <a:ext uri="{28A0092B-C50C-407E-A947-70E740481C1C}">
                 <a14:useLocalDpi xmlns:a14="http://schemas.microsoft.com/office/drawing/2010/main" val="0"/>
@@ -5520,7 +5690,7 @@
       <p:pic>
         <p:nvPicPr>
           <p:cNvPr id="40" name="Afbeelding 39" descr="Gerelateerde afbeelding">
-            <a:hlinkClick r:id="rId3" tgtFrame="&quot;_blank&quot;"/>
+            <a:hlinkClick r:id="rId4" tgtFrame="&quot;_blank&quot;"/>
             <a:extLst>
               <a:ext uri="{FF2B5EF4-FFF2-40B4-BE49-F238E27FC236}">
                 <a16:creationId xmlns:a16="http://schemas.microsoft.com/office/drawing/2014/main" id="{C5EE0BF6-7FDC-44F5-A290-EA9E370B398D}"/>
@@ -5531,7 +5701,7 @@
           <p:nvPr/>
         </p:nvPicPr>
         <p:blipFill>
-          <a:blip r:embed="rId4">
+          <a:blip r:embed="rId5">
             <a:extLst>
               <a:ext uri="{28A0092B-C50C-407E-A947-70E740481C1C}">
                 <a14:useLocalDpi xmlns:a14="http://schemas.microsoft.com/office/drawing/2010/main" val="0"/>

</xml_diff>

<commit_message>
modified slide about experiments
</commit_message>
<xml_diff>
--- a/documentation/Phase 2 experiments/Presentation second phase.pptx
+++ b/documentation/Phase 2 experiments/Presentation second phase.pptx
@@ -206,7 +206,7 @@
           <a:p>
             <a:fld id="{5A725F96-9635-4678-A485-FDC57A98AC9C}" type="datetimeFigureOut">
               <a:rPr lang="en-GB" smtClean="0"/>
-              <a:t>27/05/2019</a:t>
+              <a:t>28/05/2019</a:t>
             </a:fld>
             <a:endParaRPr lang="en-GB"/>
           </a:p>
@@ -2045,7 +2045,7 @@
           <a:p>
             <a:fld id="{AE3D364E-E8DA-4561-A064-E2CFF8B39183}" type="datetimeFigureOut">
               <a:rPr lang="nl-NL" smtClean="0"/>
-              <a:t>27-5-2019</a:t>
+              <a:t>28-5-2019</a:t>
             </a:fld>
             <a:endParaRPr lang="nl-NL"/>
           </a:p>
@@ -2243,7 +2243,7 @@
           <a:p>
             <a:fld id="{AE3D364E-E8DA-4561-A064-E2CFF8B39183}" type="datetimeFigureOut">
               <a:rPr lang="nl-NL" smtClean="0"/>
-              <a:t>27-5-2019</a:t>
+              <a:t>28-5-2019</a:t>
             </a:fld>
             <a:endParaRPr lang="nl-NL"/>
           </a:p>
@@ -2451,7 +2451,7 @@
           <a:p>
             <a:fld id="{AE3D364E-E8DA-4561-A064-E2CFF8B39183}" type="datetimeFigureOut">
               <a:rPr lang="nl-NL" smtClean="0"/>
-              <a:t>27-5-2019</a:t>
+              <a:t>28-5-2019</a:t>
             </a:fld>
             <a:endParaRPr lang="nl-NL"/>
           </a:p>
@@ -2649,7 +2649,7 @@
           <a:p>
             <a:fld id="{AE3D364E-E8DA-4561-A064-E2CFF8B39183}" type="datetimeFigureOut">
               <a:rPr lang="nl-NL" smtClean="0"/>
-              <a:t>27-5-2019</a:t>
+              <a:t>28-5-2019</a:t>
             </a:fld>
             <a:endParaRPr lang="nl-NL"/>
           </a:p>
@@ -2924,7 +2924,7 @@
           <a:p>
             <a:fld id="{AE3D364E-E8DA-4561-A064-E2CFF8B39183}" type="datetimeFigureOut">
               <a:rPr lang="nl-NL" smtClean="0"/>
-              <a:t>27-5-2019</a:t>
+              <a:t>28-5-2019</a:t>
             </a:fld>
             <a:endParaRPr lang="nl-NL"/>
           </a:p>
@@ -3189,7 +3189,7 @@
           <a:p>
             <a:fld id="{AE3D364E-E8DA-4561-A064-E2CFF8B39183}" type="datetimeFigureOut">
               <a:rPr lang="nl-NL" smtClean="0"/>
-              <a:t>27-5-2019</a:t>
+              <a:t>28-5-2019</a:t>
             </a:fld>
             <a:endParaRPr lang="nl-NL"/>
           </a:p>
@@ -3601,7 +3601,7 @@
           <a:p>
             <a:fld id="{AE3D364E-E8DA-4561-A064-E2CFF8B39183}" type="datetimeFigureOut">
               <a:rPr lang="nl-NL" smtClean="0"/>
-              <a:t>27-5-2019</a:t>
+              <a:t>28-5-2019</a:t>
             </a:fld>
             <a:endParaRPr lang="nl-NL"/>
           </a:p>
@@ -3742,7 +3742,7 @@
           <a:p>
             <a:fld id="{AE3D364E-E8DA-4561-A064-E2CFF8B39183}" type="datetimeFigureOut">
               <a:rPr lang="nl-NL" smtClean="0"/>
-              <a:t>27-5-2019</a:t>
+              <a:t>28-5-2019</a:t>
             </a:fld>
             <a:endParaRPr lang="nl-NL"/>
           </a:p>
@@ -3855,7 +3855,7 @@
           <a:p>
             <a:fld id="{AE3D364E-E8DA-4561-A064-E2CFF8B39183}" type="datetimeFigureOut">
               <a:rPr lang="nl-NL" smtClean="0"/>
-              <a:t>27-5-2019</a:t>
+              <a:t>28-5-2019</a:t>
             </a:fld>
             <a:endParaRPr lang="nl-NL"/>
           </a:p>
@@ -4166,7 +4166,7 @@
           <a:p>
             <a:fld id="{AE3D364E-E8DA-4561-A064-E2CFF8B39183}" type="datetimeFigureOut">
               <a:rPr lang="nl-NL" smtClean="0"/>
-              <a:t>27-5-2019</a:t>
+              <a:t>28-5-2019</a:t>
             </a:fld>
             <a:endParaRPr lang="nl-NL"/>
           </a:p>
@@ -4454,7 +4454,7 @@
           <a:p>
             <a:fld id="{AE3D364E-E8DA-4561-A064-E2CFF8B39183}" type="datetimeFigureOut">
               <a:rPr lang="nl-NL" smtClean="0"/>
-              <a:t>27-5-2019</a:t>
+              <a:t>28-5-2019</a:t>
             </a:fld>
             <a:endParaRPr lang="nl-NL"/>
           </a:p>
@@ -4695,7 +4695,7 @@
           <a:p>
             <a:fld id="{AE3D364E-E8DA-4561-A064-E2CFF8B39183}" type="datetimeFigureOut">
               <a:rPr lang="nl-NL" smtClean="0"/>
-              <a:t>27-5-2019</a:t>
+              <a:t>28-5-2019</a:t>
             </a:fld>
             <a:endParaRPr lang="nl-NL"/>
           </a:p>
@@ -8236,18 +8236,13 @@
           <a:p>
             <a:r>
               <a:rPr lang="nl-NL" sz="2400" dirty="0"/>
-              <a:t>Made experiments by modifying parameters, then measured the result</a:t>
-            </a:r>
-            <a:br>
-              <a:rPr lang="nl-NL" sz="2400" dirty="0"/>
-            </a:br>
+              <a:t>Made experiments by modifying parameters, then measured </a:t>
+            </a:r>
+            <a:r>
+              <a:rPr lang="nl-NL" sz="2400"/>
+              <a:t>the result</a:t>
+            </a:r>
             <a:endParaRPr lang="nl-NL" sz="2400" dirty="0"/>
-          </a:p>
-          <a:p>
-            <a:r>
-              <a:rPr lang="nl-NL" sz="2400" dirty="0"/>
-              <a:t>See Excel sheet</a:t>
-            </a:r>
           </a:p>
         </p:txBody>
       </p:sp>

</xml_diff>

<commit_message>
modified 2nd phase presentation and added Numerical Maths Presentation about Optimization
</commit_message>
<xml_diff>
--- a/documentation/Phase 2 experiments/Presentation second phase.pptx
+++ b/documentation/Phase 2 experiments/Presentation second phase.pptx
@@ -829,15 +829,7 @@
           <a:p>
             <a:r>
               <a:rPr lang="en-GB" b="1" u="sng" dirty="0"/>
-              <a:t>The improvements since the second phase are that we implemented a </a:t>
-            </a:r>
-            <a:r>
-              <a:rPr lang="en-GB" b="1" u="sng" dirty="0" err="1"/>
-              <a:t>Fourt</a:t>
-            </a:r>
-            <a:r>
-              <a:rPr lang="en-GB" b="1" u="sng" dirty="0"/>
-              <a:t>-order Runge </a:t>
+              <a:t>The improvements since the first phase are that we implemented a Fourth-order Runge-</a:t>
             </a:r>
             <a:r>
               <a:rPr lang="en-GB" b="1" u="sng" dirty="0" err="1"/>
@@ -845,7 +837,7 @@
             </a:r>
             <a:r>
               <a:rPr lang="en-GB" b="1" u="sng" dirty="0"/>
-              <a:t> method for computing the positions of the different bodies in the Solar System, which is more precise than Euler’s method. Additionally, we now have a method for computing an angle to launch the Space probe in order to reach Titan</a:t>
+              <a:t> method for computing the positions of the different bodies in the Solar System, which is more precise than Euler’s method. Additionally, we now have a method for computing an angle to launch the Space probe in in order to reach Titan</a:t>
             </a:r>
           </a:p>
         </p:txBody>
@@ -1608,13 +1600,10 @@
           </a:p>
           <a:p>
             <a:r>
-              <a:rPr lang="nl-NL" dirty="0"/>
-              <a:t>See Excel sheet </a:t>
-            </a:r>
-            <a:r>
-              <a:rPr lang="nl-NL" i="1" dirty="0"/>
-              <a:t>*show the Excel sheet to them*</a:t>
-            </a:r>
+              <a:rPr lang="nl-NL"/>
+              <a:t>Explain the results of the experiments</a:t>
+            </a:r>
+            <a:endParaRPr lang="nl-NL" i="1" dirty="0"/>
           </a:p>
         </p:txBody>
       </p:sp>
@@ -7316,7 +7305,7 @@
                   <a:srgbClr val="000000"/>
                 </a:solidFill>
               </a:rPr>
-              <a:t>the control action performed = independent of the “process output</a:t>
+              <a:t>the control action performed = independent of the “process output”</a:t>
             </a:r>
           </a:p>
           <a:p>
@@ -8236,13 +8225,8 @@
           <a:p>
             <a:r>
               <a:rPr lang="nl-NL" sz="2400" dirty="0"/>
-              <a:t>Made experiments by modifying parameters, then measured </a:t>
-            </a:r>
-            <a:r>
-              <a:rPr lang="nl-NL" sz="2400"/>
-              <a:t>the result</a:t>
-            </a:r>
-            <a:endParaRPr lang="nl-NL" sz="2400" dirty="0"/>
+              <a:t>Made experiments by modifying parameters, then measured the result</a:t>
+            </a:r>
           </a:p>
         </p:txBody>
       </p:sp>

</xml_diff>